<commit_message>
Added executable .jar file(./out/artifacts/BuckMan
</commit_message>
<xml_diff>
--- a/docs/presentation.pptx
+++ b/docs/presentation.pptx
@@ -14,8 +14,8 @@
     <p:sldId id="256" r:id="rId5"/>
     <p:sldId id="257" r:id="rId6"/>
     <p:sldId id="258" r:id="rId7"/>
-    <p:sldId id="260" r:id="rId8"/>
-    <p:sldId id="259" r:id="rId9"/>
+    <p:sldId id="259" r:id="rId8"/>
+    <p:sldId id="260" r:id="rId9"/>
     <p:sldId id="261" r:id="rId10"/>
   </p:sldIdLst>
   <p:sldSz cx="12192000" cy="6858000"/>
@@ -231,7 +231,7 @@
           <a:p>
             <a:fld id="{F6E59275-AFE1-4999-B78A-D0D76B9F2B0B}" type="datetimeFigureOut">
               <a:rPr lang="en-US" smtClean="0"/>
-              <a:t>5/20/2021</a:t>
+              <a:t>5/19/2021</a:t>
             </a:fld>
             <a:endParaRPr lang="en-US" dirty="0"/>
           </a:p>
@@ -408,7 +408,7 @@
           <a:p>
             <a:fld id="{B3EADD7A-FE61-48EE-BE0E-8546E5401374}" type="datetimeFigureOut">
               <a:rPr lang="en-US" smtClean="0"/>
-              <a:t>5/20/2021</a:t>
+              <a:t>5/19/2021</a:t>
             </a:fld>
             <a:endParaRPr lang="en-US" dirty="0"/>
           </a:p>
@@ -719,10 +719,7 @@
           <a:bodyPr/>
           <a:lstStyle/>
           <a:p>
-            <a:r>
-              <a:rPr lang="en-US" dirty="0"/>
-              <a:t>Aiden can introduce</a:t>
-            </a:r>
+            <a:endParaRPr lang="en-US" dirty="0"/>
           </a:p>
         </p:txBody>
       </p:sp>
@@ -753,441 +750,6 @@
     <p:extLst>
       <p:ext uri="{BB962C8B-B14F-4D97-AF65-F5344CB8AC3E}">
         <p14:creationId xmlns:p14="http://schemas.microsoft.com/office/powerpoint/2010/main" val="4005338275"/>
-      </p:ext>
-    </p:extLst>
-  </p:cSld>
-  <p:clrMapOvr>
-    <a:masterClrMapping/>
-  </p:clrMapOvr>
-</p:notes>
-</file>
-
-<file path=ppt/notesSlides/notesSlide2.xml><?xml version="1.0" encoding="utf-8"?>
-<p:notes xmlns:a="http://schemas.openxmlformats.org/drawingml/2006/main" xmlns:r="http://schemas.openxmlformats.org/officeDocument/2006/relationships" xmlns:p="http://schemas.openxmlformats.org/presentationml/2006/main">
-  <p:cSld>
-    <p:spTree>
-      <p:nvGrpSpPr>
-        <p:cNvPr id="1" name=""/>
-        <p:cNvGrpSpPr/>
-        <p:nvPr/>
-      </p:nvGrpSpPr>
-      <p:grpSpPr>
-        <a:xfrm>
-          <a:off x="0" y="0"/>
-          <a:ext cx="0" cy="0"/>
-          <a:chOff x="0" y="0"/>
-          <a:chExt cx="0" cy="0"/>
-        </a:xfrm>
-      </p:grpSpPr>
-      <p:sp>
-        <p:nvSpPr>
-          <p:cNvPr id="2" name="Slide Image Placeholder 1"/>
-          <p:cNvSpPr>
-            <a:spLocks noGrp="1" noRot="1" noChangeAspect="1"/>
-          </p:cNvSpPr>
-          <p:nvPr>
-            <p:ph type="sldImg"/>
-          </p:nvPr>
-        </p:nvSpPr>
-        <p:spPr/>
-      </p:sp>
-      <p:sp>
-        <p:nvSpPr>
-          <p:cNvPr id="3" name="Notes Placeholder 2"/>
-          <p:cNvSpPr>
-            <a:spLocks noGrp="1"/>
-          </p:cNvSpPr>
-          <p:nvPr>
-            <p:ph type="body" idx="1"/>
-          </p:nvPr>
-        </p:nvSpPr>
-        <p:spPr/>
-        <p:txBody>
-          <a:bodyPr/>
-          <a:lstStyle/>
-          <a:p>
-            <a:r>
-              <a:rPr lang="en-US" dirty="0"/>
-              <a:t>Aiden introduces the members, we explain what we contributed</a:t>
-            </a:r>
-          </a:p>
-        </p:txBody>
-      </p:sp>
-      <p:sp>
-        <p:nvSpPr>
-          <p:cNvPr id="4" name="Slide Number Placeholder 3"/>
-          <p:cNvSpPr>
-            <a:spLocks noGrp="1"/>
-          </p:cNvSpPr>
-          <p:nvPr>
-            <p:ph type="sldNum" sz="quarter" idx="5"/>
-          </p:nvPr>
-        </p:nvSpPr>
-        <p:spPr/>
-        <p:txBody>
-          <a:bodyPr/>
-          <a:lstStyle/>
-          <a:p>
-            <a:fld id="{EE000EEB-8338-48D7-8EE8-EE0082EF7602}" type="slidenum">
-              <a:rPr lang="en-US" smtClean="0"/>
-              <a:t>2</a:t>
-            </a:fld>
-            <a:endParaRPr lang="en-US" dirty="0"/>
-          </a:p>
-        </p:txBody>
-      </p:sp>
-    </p:spTree>
-    <p:extLst>
-      <p:ext uri="{BB962C8B-B14F-4D97-AF65-F5344CB8AC3E}">
-        <p14:creationId xmlns:p14="http://schemas.microsoft.com/office/powerpoint/2010/main" val="3439800931"/>
-      </p:ext>
-    </p:extLst>
-  </p:cSld>
-  <p:clrMapOvr>
-    <a:masterClrMapping/>
-  </p:clrMapOvr>
-</p:notes>
-</file>
-
-<file path=ppt/notesSlides/notesSlide3.xml><?xml version="1.0" encoding="utf-8"?>
-<p:notes xmlns:a="http://schemas.openxmlformats.org/drawingml/2006/main" xmlns:r="http://schemas.openxmlformats.org/officeDocument/2006/relationships" xmlns:p="http://schemas.openxmlformats.org/presentationml/2006/main">
-  <p:cSld>
-    <p:spTree>
-      <p:nvGrpSpPr>
-        <p:cNvPr id="1" name=""/>
-        <p:cNvGrpSpPr/>
-        <p:nvPr/>
-      </p:nvGrpSpPr>
-      <p:grpSpPr>
-        <a:xfrm>
-          <a:off x="0" y="0"/>
-          <a:ext cx="0" cy="0"/>
-          <a:chOff x="0" y="0"/>
-          <a:chExt cx="0" cy="0"/>
-        </a:xfrm>
-      </p:grpSpPr>
-      <p:sp>
-        <p:nvSpPr>
-          <p:cNvPr id="2" name="Slide Image Placeholder 1"/>
-          <p:cNvSpPr>
-            <a:spLocks noGrp="1" noRot="1" noChangeAspect="1"/>
-          </p:cNvSpPr>
-          <p:nvPr>
-            <p:ph type="sldImg"/>
-          </p:nvPr>
-        </p:nvSpPr>
-        <p:spPr/>
-      </p:sp>
-      <p:sp>
-        <p:nvSpPr>
-          <p:cNvPr id="3" name="Notes Placeholder 2"/>
-          <p:cNvSpPr>
-            <a:spLocks noGrp="1"/>
-          </p:cNvSpPr>
-          <p:nvPr>
-            <p:ph type="body" idx="1"/>
-          </p:nvPr>
-        </p:nvSpPr>
-        <p:spPr/>
-        <p:txBody>
-          <a:bodyPr/>
-          <a:lstStyle/>
-          <a:p>
-            <a:r>
-              <a:rPr lang="en-US" dirty="0"/>
-              <a:t>Rachel explains what Pac-Man is and our game design</a:t>
-            </a:r>
-          </a:p>
-        </p:txBody>
-      </p:sp>
-      <p:sp>
-        <p:nvSpPr>
-          <p:cNvPr id="4" name="Slide Number Placeholder 3"/>
-          <p:cNvSpPr>
-            <a:spLocks noGrp="1"/>
-          </p:cNvSpPr>
-          <p:nvPr>
-            <p:ph type="sldNum" sz="quarter" idx="5"/>
-          </p:nvPr>
-        </p:nvSpPr>
-        <p:spPr/>
-        <p:txBody>
-          <a:bodyPr/>
-          <a:lstStyle/>
-          <a:p>
-            <a:fld id="{EE000EEB-8338-48D7-8EE8-EE0082EF7602}" type="slidenum">
-              <a:rPr lang="en-US" smtClean="0"/>
-              <a:t>3</a:t>
-            </a:fld>
-            <a:endParaRPr lang="en-US" dirty="0"/>
-          </a:p>
-        </p:txBody>
-      </p:sp>
-    </p:spTree>
-    <p:extLst>
-      <p:ext uri="{BB962C8B-B14F-4D97-AF65-F5344CB8AC3E}">
-        <p14:creationId xmlns:p14="http://schemas.microsoft.com/office/powerpoint/2010/main" val="1815711654"/>
-      </p:ext>
-    </p:extLst>
-  </p:cSld>
-  <p:clrMapOvr>
-    <a:masterClrMapping/>
-  </p:clrMapOvr>
-</p:notes>
-</file>
-
-<file path=ppt/notesSlides/notesSlide4.xml><?xml version="1.0" encoding="utf-8"?>
-<p:notes xmlns:a="http://schemas.openxmlformats.org/drawingml/2006/main" xmlns:r="http://schemas.openxmlformats.org/officeDocument/2006/relationships" xmlns:p="http://schemas.openxmlformats.org/presentationml/2006/main">
-  <p:cSld>
-    <p:spTree>
-      <p:nvGrpSpPr>
-        <p:cNvPr id="1" name=""/>
-        <p:cNvGrpSpPr/>
-        <p:nvPr/>
-      </p:nvGrpSpPr>
-      <p:grpSpPr>
-        <a:xfrm>
-          <a:off x="0" y="0"/>
-          <a:ext cx="0" cy="0"/>
-          <a:chOff x="0" y="0"/>
-          <a:chExt cx="0" cy="0"/>
-        </a:xfrm>
-      </p:grpSpPr>
-      <p:sp>
-        <p:nvSpPr>
-          <p:cNvPr id="2" name="Slide Image Placeholder 1"/>
-          <p:cNvSpPr>
-            <a:spLocks noGrp="1" noRot="1" noChangeAspect="1"/>
-          </p:cNvSpPr>
-          <p:nvPr>
-            <p:ph type="sldImg"/>
-          </p:nvPr>
-        </p:nvSpPr>
-        <p:spPr/>
-      </p:sp>
-      <p:sp>
-        <p:nvSpPr>
-          <p:cNvPr id="3" name="Notes Placeholder 2"/>
-          <p:cNvSpPr>
-            <a:spLocks noGrp="1"/>
-          </p:cNvSpPr>
-          <p:nvPr>
-            <p:ph type="body" idx="1"/>
-          </p:nvPr>
-        </p:nvSpPr>
-        <p:spPr/>
-        <p:txBody>
-          <a:bodyPr/>
-          <a:lstStyle/>
-          <a:p>
-            <a:r>
-              <a:rPr lang="en-US" dirty="0"/>
-              <a:t>Jane can do demo</a:t>
-            </a:r>
-          </a:p>
-        </p:txBody>
-      </p:sp>
-      <p:sp>
-        <p:nvSpPr>
-          <p:cNvPr id="4" name="Slide Number Placeholder 3"/>
-          <p:cNvSpPr>
-            <a:spLocks noGrp="1"/>
-          </p:cNvSpPr>
-          <p:nvPr>
-            <p:ph type="sldNum" sz="quarter" idx="5"/>
-          </p:nvPr>
-        </p:nvSpPr>
-        <p:spPr/>
-        <p:txBody>
-          <a:bodyPr/>
-          <a:lstStyle/>
-          <a:p>
-            <a:fld id="{EE000EEB-8338-48D7-8EE8-EE0082EF7602}" type="slidenum">
-              <a:rPr lang="en-US" smtClean="0"/>
-              <a:t>4</a:t>
-            </a:fld>
-            <a:endParaRPr lang="en-US" dirty="0"/>
-          </a:p>
-        </p:txBody>
-      </p:sp>
-    </p:spTree>
-    <p:extLst>
-      <p:ext uri="{BB962C8B-B14F-4D97-AF65-F5344CB8AC3E}">
-        <p14:creationId xmlns:p14="http://schemas.microsoft.com/office/powerpoint/2010/main" val="3987050306"/>
-      </p:ext>
-    </p:extLst>
-  </p:cSld>
-  <p:clrMapOvr>
-    <a:masterClrMapping/>
-  </p:clrMapOvr>
-</p:notes>
-</file>
-
-<file path=ppt/notesSlides/notesSlide5.xml><?xml version="1.0" encoding="utf-8"?>
-<p:notes xmlns:a="http://schemas.openxmlformats.org/drawingml/2006/main" xmlns:r="http://schemas.openxmlformats.org/officeDocument/2006/relationships" xmlns:p="http://schemas.openxmlformats.org/presentationml/2006/main">
-  <p:cSld>
-    <p:spTree>
-      <p:nvGrpSpPr>
-        <p:cNvPr id="1" name=""/>
-        <p:cNvGrpSpPr/>
-        <p:nvPr/>
-      </p:nvGrpSpPr>
-      <p:grpSpPr>
-        <a:xfrm>
-          <a:off x="0" y="0"/>
-          <a:ext cx="0" cy="0"/>
-          <a:chOff x="0" y="0"/>
-          <a:chExt cx="0" cy="0"/>
-        </a:xfrm>
-      </p:grpSpPr>
-      <p:sp>
-        <p:nvSpPr>
-          <p:cNvPr id="2" name="Slide Image Placeholder 1"/>
-          <p:cNvSpPr>
-            <a:spLocks noGrp="1" noRot="1" noChangeAspect="1"/>
-          </p:cNvSpPr>
-          <p:nvPr>
-            <p:ph type="sldImg"/>
-          </p:nvPr>
-        </p:nvSpPr>
-        <p:spPr/>
-      </p:sp>
-      <p:sp>
-        <p:nvSpPr>
-          <p:cNvPr id="3" name="Notes Placeholder 2"/>
-          <p:cNvSpPr>
-            <a:spLocks noGrp="1"/>
-          </p:cNvSpPr>
-          <p:nvPr>
-            <p:ph type="body" idx="1"/>
-          </p:nvPr>
-        </p:nvSpPr>
-        <p:spPr/>
-        <p:txBody>
-          <a:bodyPr/>
-          <a:lstStyle/>
-          <a:p>
-            <a:r>
-              <a:rPr lang="en-US" dirty="0"/>
-              <a:t>Nick explains implementation</a:t>
-            </a:r>
-          </a:p>
-        </p:txBody>
-      </p:sp>
-      <p:sp>
-        <p:nvSpPr>
-          <p:cNvPr id="4" name="Slide Number Placeholder 3"/>
-          <p:cNvSpPr>
-            <a:spLocks noGrp="1"/>
-          </p:cNvSpPr>
-          <p:nvPr>
-            <p:ph type="sldNum" sz="quarter" idx="5"/>
-          </p:nvPr>
-        </p:nvSpPr>
-        <p:spPr/>
-        <p:txBody>
-          <a:bodyPr/>
-          <a:lstStyle/>
-          <a:p>
-            <a:fld id="{EE000EEB-8338-48D7-8EE8-EE0082EF7602}" type="slidenum">
-              <a:rPr lang="en-US" smtClean="0"/>
-              <a:t>5</a:t>
-            </a:fld>
-            <a:endParaRPr lang="en-US" dirty="0"/>
-          </a:p>
-        </p:txBody>
-      </p:sp>
-    </p:spTree>
-    <p:extLst>
-      <p:ext uri="{BB962C8B-B14F-4D97-AF65-F5344CB8AC3E}">
-        <p14:creationId xmlns:p14="http://schemas.microsoft.com/office/powerpoint/2010/main" val="1341485409"/>
-      </p:ext>
-    </p:extLst>
-  </p:cSld>
-  <p:clrMapOvr>
-    <a:masterClrMapping/>
-  </p:clrMapOvr>
-</p:notes>
-</file>
-
-<file path=ppt/notesSlides/notesSlide6.xml><?xml version="1.0" encoding="utf-8"?>
-<p:notes xmlns:a="http://schemas.openxmlformats.org/drawingml/2006/main" xmlns:r="http://schemas.openxmlformats.org/officeDocument/2006/relationships" xmlns:p="http://schemas.openxmlformats.org/presentationml/2006/main">
-  <p:cSld>
-    <p:spTree>
-      <p:nvGrpSpPr>
-        <p:cNvPr id="1" name=""/>
-        <p:cNvGrpSpPr/>
-        <p:nvPr/>
-      </p:nvGrpSpPr>
-      <p:grpSpPr>
-        <a:xfrm>
-          <a:off x="0" y="0"/>
-          <a:ext cx="0" cy="0"/>
-          <a:chOff x="0" y="0"/>
-          <a:chExt cx="0" cy="0"/>
-        </a:xfrm>
-      </p:grpSpPr>
-      <p:sp>
-        <p:nvSpPr>
-          <p:cNvPr id="2" name="Slide Image Placeholder 1"/>
-          <p:cNvSpPr>
-            <a:spLocks noGrp="1" noRot="1" noChangeAspect="1"/>
-          </p:cNvSpPr>
-          <p:nvPr>
-            <p:ph type="sldImg"/>
-          </p:nvPr>
-        </p:nvSpPr>
-        <p:spPr/>
-      </p:sp>
-      <p:sp>
-        <p:nvSpPr>
-          <p:cNvPr id="3" name="Notes Placeholder 2"/>
-          <p:cNvSpPr>
-            <a:spLocks noGrp="1"/>
-          </p:cNvSpPr>
-          <p:nvPr>
-            <p:ph type="body" idx="1"/>
-          </p:nvPr>
-        </p:nvSpPr>
-        <p:spPr/>
-        <p:txBody>
-          <a:bodyPr/>
-          <a:lstStyle/>
-          <a:p>
-            <a:r>
-              <a:rPr lang="en-US" dirty="0"/>
-              <a:t>Emily can reflect</a:t>
-            </a:r>
-          </a:p>
-        </p:txBody>
-      </p:sp>
-      <p:sp>
-        <p:nvSpPr>
-          <p:cNvPr id="4" name="Slide Number Placeholder 3"/>
-          <p:cNvSpPr>
-            <a:spLocks noGrp="1"/>
-          </p:cNvSpPr>
-          <p:nvPr>
-            <p:ph type="sldNum" sz="quarter" idx="5"/>
-          </p:nvPr>
-        </p:nvSpPr>
-        <p:spPr/>
-        <p:txBody>
-          <a:bodyPr/>
-          <a:lstStyle/>
-          <a:p>
-            <a:fld id="{EE000EEB-8338-48D7-8EE8-EE0082EF7602}" type="slidenum">
-              <a:rPr lang="en-US" smtClean="0"/>
-              <a:t>6</a:t>
-            </a:fld>
-            <a:endParaRPr lang="en-US" dirty="0"/>
-          </a:p>
-        </p:txBody>
-      </p:sp>
-    </p:spTree>
-    <p:extLst>
-      <p:ext uri="{BB962C8B-B14F-4D97-AF65-F5344CB8AC3E}">
-        <p14:creationId xmlns:p14="http://schemas.microsoft.com/office/powerpoint/2010/main" val="2683553090"/>
       </p:ext>
     </p:extLst>
   </p:cSld>
@@ -1380,7 +942,7 @@
           <a:p>
             <a:fld id="{4AAD347D-5ACD-4C99-B74B-A9C85AD731AF}" type="datetimeFigureOut">
               <a:rPr lang="en-US" dirty="0"/>
-              <a:t>5/20/2021</a:t>
+              <a:t>5/19/2021</a:t>
             </a:fld>
             <a:endParaRPr lang="en-US" dirty="0"/>
           </a:p>
@@ -1650,7 +1212,7 @@
           <a:p>
             <a:fld id="{4509A250-FF31-4206-8172-F9D3106AACB1}" type="datetimeFigureOut">
               <a:rPr lang="en-US" dirty="0"/>
-              <a:t>5/20/2021</a:t>
+              <a:t>5/19/2021</a:t>
             </a:fld>
             <a:endParaRPr lang="en-US" dirty="0"/>
           </a:p>
@@ -1839,7 +1401,7 @@
           <a:p>
             <a:fld id="{4509A250-FF31-4206-8172-F9D3106AACB1}" type="datetimeFigureOut">
               <a:rPr lang="en-US" dirty="0"/>
-              <a:t>5/20/2021</a:t>
+              <a:t>5/19/2021</a:t>
             </a:fld>
             <a:endParaRPr lang="en-US" dirty="0"/>
           </a:p>
@@ -2102,7 +1664,7 @@
           <a:p>
             <a:fld id="{4509A250-FF31-4206-8172-F9D3106AACB1}" type="datetimeFigureOut">
               <a:rPr lang="en-US" dirty="0"/>
-              <a:t>5/20/2021</a:t>
+              <a:t>5/19/2021</a:t>
             </a:fld>
             <a:endParaRPr lang="en-US" dirty="0"/>
           </a:p>
@@ -2429,7 +1991,7 @@
           <a:p>
             <a:fld id="{4509A250-FF31-4206-8172-F9D3106AACB1}" type="datetimeFigureOut">
               <a:rPr lang="en-US" dirty="0"/>
-              <a:t>5/20/2021</a:t>
+              <a:t>5/19/2021</a:t>
             </a:fld>
             <a:endParaRPr lang="en-US" dirty="0"/>
           </a:p>
@@ -3034,7 +2596,7 @@
           <a:p>
             <a:fld id="{4509A250-FF31-4206-8172-F9D3106AACB1}" type="datetimeFigureOut">
               <a:rPr lang="en-US" dirty="0"/>
-              <a:t>5/20/2021</a:t>
+              <a:t>5/19/2021</a:t>
             </a:fld>
             <a:endParaRPr lang="en-US" dirty="0"/>
           </a:p>
@@ -3876,7 +3438,7 @@
           <a:p>
             <a:fld id="{4509A250-FF31-4206-8172-F9D3106AACB1}" type="datetimeFigureOut">
               <a:rPr lang="en-US" dirty="0"/>
-              <a:t>5/20/2021</a:t>
+              <a:t>5/19/2021</a:t>
             </a:fld>
             <a:endParaRPr lang="en-US" dirty="0"/>
           </a:p>
@@ -4041,7 +3603,7 @@
           <a:p>
             <a:fld id="{4509A250-FF31-4206-8172-F9D3106AACB1}" type="datetimeFigureOut">
               <a:rPr lang="en-US" dirty="0"/>
-              <a:t>5/20/2021</a:t>
+              <a:t>5/19/2021</a:t>
             </a:fld>
             <a:endParaRPr lang="en-US" dirty="0"/>
           </a:p>
@@ -4216,7 +3778,7 @@
           <a:p>
             <a:fld id="{4509A250-FF31-4206-8172-F9D3106AACB1}" type="datetimeFigureOut">
               <a:rPr lang="en-US" dirty="0"/>
-              <a:t>5/20/2021</a:t>
+              <a:t>5/19/2021</a:t>
             </a:fld>
             <a:endParaRPr lang="en-US" dirty="0"/>
           </a:p>
@@ -4381,7 +3943,7 @@
           <a:p>
             <a:fld id="{4509A250-FF31-4206-8172-F9D3106AACB1}" type="datetimeFigureOut">
               <a:rPr lang="en-US" dirty="0"/>
-              <a:t>5/20/2021</a:t>
+              <a:t>5/19/2021</a:t>
             </a:fld>
             <a:endParaRPr lang="en-US" dirty="0"/>
           </a:p>
@@ -4620,7 +4182,7 @@
           <a:p>
             <a:fld id="{4509A250-FF31-4206-8172-F9D3106AACB1}" type="datetimeFigureOut">
               <a:rPr lang="en-US" dirty="0"/>
-              <a:t>5/20/2021</a:t>
+              <a:t>5/19/2021</a:t>
             </a:fld>
             <a:endParaRPr lang="en-US" dirty="0"/>
           </a:p>
@@ -4907,7 +4469,7 @@
           <a:p>
             <a:fld id="{4509A250-FF31-4206-8172-F9D3106AACB1}" type="datetimeFigureOut">
               <a:rPr lang="en-US" dirty="0"/>
-              <a:t>5/20/2021</a:t>
+              <a:t>5/19/2021</a:t>
             </a:fld>
             <a:endParaRPr lang="en-US" dirty="0"/>
           </a:p>
@@ -5340,7 +4902,7 @@
           <a:p>
             <a:fld id="{4509A250-FF31-4206-8172-F9D3106AACB1}" type="datetimeFigureOut">
               <a:rPr lang="en-US" dirty="0"/>
-              <a:t>5/20/2021</a:t>
+              <a:t>5/19/2021</a:t>
             </a:fld>
             <a:endParaRPr lang="en-US" dirty="0"/>
           </a:p>
@@ -5453,7 +5015,7 @@
           <a:p>
             <a:fld id="{4509A250-FF31-4206-8172-F9D3106AACB1}" type="datetimeFigureOut">
               <a:rPr lang="en-US" dirty="0"/>
-              <a:t>5/20/2021</a:t>
+              <a:t>5/19/2021</a:t>
             </a:fld>
             <a:endParaRPr lang="en-US" dirty="0"/>
           </a:p>
@@ -5543,7 +5105,7 @@
           <a:p>
             <a:fld id="{4509A250-FF31-4206-8172-F9D3106AACB1}" type="datetimeFigureOut">
               <a:rPr lang="en-US" dirty="0"/>
-              <a:t>5/20/2021</a:t>
+              <a:t>5/19/2021</a:t>
             </a:fld>
             <a:endParaRPr lang="en-US" dirty="0"/>
           </a:p>
@@ -5817,7 +5379,7 @@
           <a:p>
             <a:fld id="{4509A250-FF31-4206-8172-F9D3106AACB1}" type="datetimeFigureOut">
               <a:rPr lang="en-US" dirty="0"/>
-              <a:t>5/20/2021</a:t>
+              <a:t>5/19/2021</a:t>
             </a:fld>
             <a:endParaRPr lang="en-US" dirty="0"/>
           </a:p>
@@ -6087,7 +5649,7 @@
           <a:p>
             <a:fld id="{4509A250-FF31-4206-8172-F9D3106AACB1}" type="datetimeFigureOut">
               <a:rPr lang="en-US" dirty="0"/>
-              <a:t>5/20/2021</a:t>
+              <a:t>5/19/2021</a:t>
             </a:fld>
             <a:endParaRPr lang="en-US" dirty="0"/>
           </a:p>
@@ -6511,7 +6073,7 @@
           <a:p>
             <a:fld id="{4509A250-FF31-4206-8172-F9D3106AACB1}" type="datetimeFigureOut">
               <a:rPr lang="en-US" dirty="0"/>
-              <a:t>5/20/2021</a:t>
+              <a:t>5/19/2021</a:t>
             </a:fld>
             <a:endParaRPr lang="en-US" dirty="0"/>
           </a:p>
@@ -7405,12 +6967,7 @@
             <p:ph idx="1"/>
           </p:nvPr>
         </p:nvSpPr>
-        <p:spPr>
-          <a:xfrm>
-            <a:off x="1060450" y="1690970"/>
-            <a:ext cx="8946541" cy="4195481"/>
-          </a:xfrm>
-        </p:spPr>
+        <p:spPr/>
         <p:txBody>
           <a:bodyPr>
             <a:normAutofit/>
@@ -7420,12 +6977,6 @@
             <a:r>
               <a:rPr lang="en-US" sz="2800" dirty="0"/>
               <a:t>Buck-Man!</a:t>
-            </a:r>
-          </a:p>
-          <a:p>
-            <a:r>
-              <a:rPr lang="en-US" sz="2800" dirty="0"/>
-              <a:t>Same gameplay as Pac-Man, but with Bucknell visuals</a:t>
             </a:r>
           </a:p>
         </p:txBody>
@@ -7445,15 +6996,15 @@
           <p:nvPr/>
         </p:nvPicPr>
         <p:blipFill>
-          <a:blip r:embed="rId3"/>
+          <a:blip r:embed="rId2"/>
           <a:stretch>
             <a:fillRect/>
           </a:stretch>
         </p:blipFill>
         <p:spPr>
           <a:xfrm>
-            <a:off x="7067551" y="3907896"/>
-            <a:ext cx="1816708" cy="2269068"/>
+            <a:off x="7693718" y="2914651"/>
+            <a:ext cx="2276391" cy="2843212"/>
           </a:xfrm>
           <a:prstGeom prst="rect">
             <a:avLst/>
@@ -7475,66 +7026,19 @@
           <p:nvPr/>
         </p:nvPicPr>
         <p:blipFill>
-          <a:blip r:embed="rId4"/>
+          <a:blip r:embed="rId3"/>
           <a:stretch>
             <a:fillRect/>
           </a:stretch>
         </p:blipFill>
         <p:spPr>
           <a:xfrm>
-            <a:off x="722312" y="3614738"/>
-            <a:ext cx="4124295" cy="2714624"/>
+            <a:off x="1103312" y="3119437"/>
+            <a:ext cx="4876800" cy="3209925"/>
           </a:xfrm>
           <a:prstGeom prst="rect">
             <a:avLst/>
           </a:prstGeom>
-        </p:spPr>
-      </p:pic>
-      <p:pic>
-        <p:nvPicPr>
-          <p:cNvPr id="1026" name="Picture 2" descr="PAC-MAN - Photos | Facebook">
-            <a:extLst>
-              <a:ext uri="{FF2B5EF4-FFF2-40B4-BE49-F238E27FC236}">
-                <a16:creationId xmlns:a16="http://schemas.microsoft.com/office/drawing/2014/main" id="{FEC8D4B1-E190-4F70-9CE4-A34FB8569965}"/>
-              </a:ext>
-            </a:extLst>
-          </p:cNvPr>
-          <p:cNvPicPr>
-            <a:picLocks noChangeAspect="1" noChangeArrowheads="1"/>
-          </p:cNvPicPr>
-          <p:nvPr/>
-        </p:nvPicPr>
-        <p:blipFill>
-          <a:blip r:embed="rId5">
-            <a:extLst>
-              <a:ext uri="{28A0092B-C50C-407E-A947-70E740481C1C}">
-                <a14:useLocalDpi xmlns:a14="http://schemas.microsoft.com/office/drawing/2010/main" val="0"/>
-              </a:ext>
-            </a:extLst>
-          </a:blip>
-          <a:srcRect/>
-          <a:stretch>
-            <a:fillRect/>
-          </a:stretch>
-        </p:blipFill>
-        <p:spPr bwMode="auto">
-          <a:xfrm>
-            <a:off x="8448674" y="294606"/>
-            <a:ext cx="3405187" cy="1906905"/>
-          </a:xfrm>
-          <a:prstGeom prst="rect">
-            <a:avLst/>
-          </a:prstGeom>
-          <a:noFill/>
-          <a:extLst>
-            <a:ext uri="{909E8E84-426E-40DD-AFC4-6F175D3DCCD1}">
-              <a14:hiddenFill xmlns:a14="http://schemas.microsoft.com/office/drawing/2010/main">
-                <a:solidFill>
-                  <a:srgbClr val="FFFFFF"/>
-                </a:solidFill>
-              </a14:hiddenFill>
-            </a:ext>
-          </a:extLst>
         </p:spPr>
       </p:pic>
     </p:spTree>
@@ -7572,7 +7076,7 @@
           <p:cNvPr id="2" name="Title 1">
             <a:extLst>
               <a:ext uri="{FF2B5EF4-FFF2-40B4-BE49-F238E27FC236}">
-                <a16:creationId xmlns:a16="http://schemas.microsoft.com/office/drawing/2014/main" id="{54897245-C5D4-4198-ACB4-4077988005D7}"/>
+                <a16:creationId xmlns:a16="http://schemas.microsoft.com/office/drawing/2014/main" id="{2E282A52-8349-4A59-A9BC-BDF0038AB1D1}"/>
               </a:ext>
             </a:extLst>
           </p:cNvPr>
@@ -7580,62 +7084,54 @@
             <a:spLocks noGrp="1"/>
           </p:cNvSpPr>
           <p:nvPr>
-            <p:ph type="ctrTitle"/>
-          </p:nvPr>
-        </p:nvSpPr>
-        <p:spPr>
-          <a:xfrm>
-            <a:off x="1154955" y="1447800"/>
-            <a:ext cx="8825658" cy="3329581"/>
-          </a:xfrm>
-        </p:spPr>
-        <p:txBody>
-          <a:bodyPr anchor="b">
-            <a:normAutofit/>
-          </a:bodyPr>
+            <p:ph type="title"/>
+          </p:nvPr>
+        </p:nvSpPr>
+        <p:spPr/>
+        <p:txBody>
+          <a:bodyPr/>
           <a:lstStyle/>
           <a:p>
             <a:r>
               <a:rPr lang="en-US" dirty="0"/>
-              <a:t>Demo!</a:t>
-            </a:r>
-          </a:p>
-        </p:txBody>
-      </p:sp>
-      <p:sp>
-        <p:nvSpPr>
-          <p:cNvPr id="8" name="Subtitle 2">
+              <a:t>Implementation</a:t>
+            </a:r>
+          </a:p>
+        </p:txBody>
+      </p:sp>
+      <p:pic>
+        <p:nvPicPr>
+          <p:cNvPr id="5" name="Content Placeholder 4" descr="A picture containing timeline&#10;&#10;Description automatically generated">
             <a:extLst>
               <a:ext uri="{FF2B5EF4-FFF2-40B4-BE49-F238E27FC236}">
-                <a16:creationId xmlns:a16="http://schemas.microsoft.com/office/drawing/2014/main" id="{3ABDA07A-5310-4B64-9D2D-5FD60FEBDDF8}"/>
+                <a16:creationId xmlns:a16="http://schemas.microsoft.com/office/drawing/2014/main" id="{A08DDE25-AC48-458F-A3AF-23D76B997A99}"/>
               </a:ext>
             </a:extLst>
           </p:cNvPr>
-          <p:cNvSpPr>
-            <a:spLocks noGrp="1"/>
-          </p:cNvSpPr>
-          <p:nvPr>
-            <p:ph type="subTitle" idx="1"/>
-          </p:nvPr>
-        </p:nvSpPr>
+          <p:cNvPicPr>
+            <a:picLocks noGrp="1" noChangeAspect="1"/>
+          </p:cNvPicPr>
+          <p:nvPr>
+            <p:ph idx="1"/>
+          </p:nvPr>
+        </p:nvPicPr>
+        <p:blipFill>
+          <a:blip r:embed="rId2"/>
+          <a:stretch>
+            <a:fillRect/>
+          </a:stretch>
+        </p:blipFill>
         <p:spPr>
           <a:xfrm>
-            <a:off x="1154955" y="4777380"/>
-            <a:ext cx="8825658" cy="861420"/>
+            <a:off x="3657601" y="839283"/>
+            <a:ext cx="7277379" cy="5623430"/>
           </a:xfrm>
         </p:spPr>
-        <p:txBody>
-          <a:bodyPr/>
-          <a:lstStyle/>
-          <a:p>
-            <a:endParaRPr lang="en-US"/>
-          </a:p>
-        </p:txBody>
-      </p:sp>
+      </p:pic>
     </p:spTree>
     <p:extLst>
       <p:ext uri="{BB962C8B-B14F-4D97-AF65-F5344CB8AC3E}">
-        <p14:creationId xmlns:p14="http://schemas.microsoft.com/office/powerpoint/2010/main" val="3682760097"/>
+        <p14:creationId xmlns:p14="http://schemas.microsoft.com/office/powerpoint/2010/main" val="1474571717"/>
       </p:ext>
     </p:extLst>
   </p:cSld>
@@ -7667,7 +7163,7 @@
           <p:cNvPr id="2" name="Title 1">
             <a:extLst>
               <a:ext uri="{FF2B5EF4-FFF2-40B4-BE49-F238E27FC236}">
-                <a16:creationId xmlns:a16="http://schemas.microsoft.com/office/drawing/2014/main" id="{2E282A52-8349-4A59-A9BC-BDF0038AB1D1}"/>
+                <a16:creationId xmlns:a16="http://schemas.microsoft.com/office/drawing/2014/main" id="{54897245-C5D4-4198-ACB4-4077988005D7}"/>
               </a:ext>
             </a:extLst>
           </p:cNvPr>
@@ -7675,13 +7171,13 @@
             <a:spLocks noGrp="1"/>
           </p:cNvSpPr>
           <p:nvPr>
-            <p:ph type="title"/>
+            <p:ph type="ctrTitle"/>
           </p:nvPr>
         </p:nvSpPr>
         <p:spPr>
           <a:xfrm>
-            <a:off x="1154954" y="1447800"/>
-            <a:ext cx="3401064" cy="1447800"/>
+            <a:off x="1154955" y="1447800"/>
+            <a:ext cx="8825658" cy="3329581"/>
           </a:xfrm>
         </p:spPr>
         <p:txBody>
@@ -7692,103 +7188,45 @@
           <a:p>
             <a:r>
               <a:rPr lang="en-US" dirty="0"/>
-              <a:t>Implementation</a:t>
-            </a:r>
-          </a:p>
-        </p:txBody>
-      </p:sp>
-      <p:pic>
-        <p:nvPicPr>
-          <p:cNvPr id="7" name="Picture 6">
+              <a:t>Demo!</a:t>
+            </a:r>
+          </a:p>
+        </p:txBody>
+      </p:sp>
+      <p:sp>
+        <p:nvSpPr>
+          <p:cNvPr id="8" name="Subtitle 2">
             <a:extLst>
               <a:ext uri="{FF2B5EF4-FFF2-40B4-BE49-F238E27FC236}">
-                <a16:creationId xmlns:a16="http://schemas.microsoft.com/office/drawing/2014/main" id="{5BD3B67F-9455-4488-886E-B3C1CFF8CE93}"/>
+                <a16:creationId xmlns:a16="http://schemas.microsoft.com/office/drawing/2014/main" id="{3ABDA07A-5310-4B64-9D2D-5FD60FEBDDF8}"/>
               </a:ext>
             </a:extLst>
           </p:cNvPr>
-          <p:cNvPicPr>
-            <a:picLocks noChangeAspect="1"/>
-          </p:cNvPicPr>
-          <p:nvPr/>
-        </p:nvPicPr>
-        <p:blipFill>
-          <a:blip r:embed="rId3"/>
-          <a:stretch>
-            <a:fillRect/>
-          </a:stretch>
-        </p:blipFill>
+          <p:cNvSpPr>
+            <a:spLocks noGrp="1"/>
+          </p:cNvSpPr>
+          <p:nvPr>
+            <p:ph type="subTitle" idx="1"/>
+          </p:nvPr>
+        </p:nvSpPr>
         <p:spPr>
           <a:xfrm>
-            <a:off x="5043033" y="599915"/>
-            <a:ext cx="6466480" cy="5658170"/>
-          </a:xfrm>
-          <a:prstGeom prst="rect">
-            <a:avLst/>
-          </a:prstGeom>
-          <a:noFill/>
-        </p:spPr>
-      </p:pic>
-      <p:sp>
-        <p:nvSpPr>
-          <p:cNvPr id="12" name="Text Placeholder 3">
-            <a:extLst>
-              <a:ext uri="{FF2B5EF4-FFF2-40B4-BE49-F238E27FC236}">
-                <a16:creationId xmlns:a16="http://schemas.microsoft.com/office/drawing/2014/main" id="{8054E44D-7E2C-4A5F-893F-714DE7CE9E19}"/>
-              </a:ext>
-            </a:extLst>
-          </p:cNvPr>
-          <p:cNvSpPr>
-            <a:spLocks noGrp="1"/>
-          </p:cNvSpPr>
-          <p:nvPr>
-            <p:ph type="body" sz="half" idx="2"/>
-          </p:nvPr>
-        </p:nvSpPr>
-        <p:spPr>
-          <a:xfrm>
-            <a:off x="1154954" y="3129280"/>
-            <a:ext cx="3401063" cy="2895599"/>
+            <a:off x="1154955" y="4777380"/>
+            <a:ext cx="8825658" cy="861420"/>
           </a:xfrm>
         </p:spPr>
         <p:txBody>
           <a:bodyPr/>
           <a:lstStyle/>
           <a:p>
-            <a:r>
-              <a:rPr lang="en-US" dirty="0"/>
-              <a:t>MVC JavaFX Design</a:t>
-            </a:r>
-          </a:p>
-          <a:p>
-            <a:r>
-              <a:rPr lang="en-US" dirty="0"/>
-              <a:t>Menus are separate from the in-game features</a:t>
-            </a:r>
-          </a:p>
-          <a:p>
-            <a:r>
-              <a:rPr lang="en-US" dirty="0"/>
-              <a:t>Use of Enum classes to store direction and maze cell values</a:t>
-            </a:r>
-          </a:p>
-          <a:p>
-            <a:r>
-              <a:rPr lang="en-US" dirty="0">
-                <a:hlinkClick r:id="rId4"/>
-              </a:rPr>
-              <a:t>https://lucid.app/lucidchart/1789d4fd-35c0-4b8a-bf09-7c142b0d353f/edit?page=0_0#</a:t>
-            </a:r>
-            <a:endParaRPr lang="en-US" dirty="0"/>
-          </a:p>
-          <a:p>
-            <a:endParaRPr lang="en-US" dirty="0"/>
+            <a:endParaRPr lang="en-US"/>
           </a:p>
         </p:txBody>
       </p:sp>
     </p:spTree>
     <p:extLst>
       <p:ext uri="{BB962C8B-B14F-4D97-AF65-F5344CB8AC3E}">
-        <p14:creationId xmlns:p14="http://schemas.microsoft.com/office/powerpoint/2010/main" val="1474571717"/>
+        <p14:creationId xmlns:p14="http://schemas.microsoft.com/office/powerpoint/2010/main" val="3682760097"/>
       </p:ext>
     </p:extLst>
   </p:cSld>
@@ -7862,73 +7300,19 @@
         <p:spPr/>
         <p:txBody>
           <a:bodyPr>
-            <a:normAutofit fontScale="92500"/>
+            <a:normAutofit/>
           </a:bodyPr>
           <a:lstStyle/>
           <a:p>
             <a:r>
-              <a:rPr lang="en-US" dirty="0"/>
-              <a:t>Strengths:</a:t>
-            </a:r>
-          </a:p>
-          <a:p>
-            <a:pPr lvl="1"/>
-            <a:r>
-              <a:rPr lang="en-US" sz="2000" dirty="0"/>
-              <a:t>MVC Implementation</a:t>
-            </a:r>
-          </a:p>
-          <a:p>
-            <a:r>
-              <a:rPr lang="en-US" dirty="0"/>
-              <a:t>Challenges:</a:t>
-            </a:r>
-          </a:p>
-          <a:p>
-            <a:pPr lvl="1"/>
-            <a:r>
-              <a:rPr lang="en-US" sz="2000" dirty="0"/>
-              <a:t>Timing, starting slow and having to crunch at the end</a:t>
-            </a:r>
-          </a:p>
-          <a:p>
-            <a:r>
-              <a:rPr lang="en-US" sz="2200" dirty="0"/>
-              <a:t>Successes:</a:t>
-            </a:r>
-          </a:p>
-          <a:p>
-            <a:pPr lvl="1"/>
-            <a:r>
-              <a:rPr lang="en-US" sz="2000" dirty="0"/>
-              <a:t>Teamwork, communication (especially in the crunch at the end)</a:t>
-            </a:r>
-          </a:p>
-          <a:p>
-            <a:pPr lvl="1"/>
-            <a:r>
-              <a:rPr lang="en-US" sz="2200" dirty="0"/>
-              <a:t>When one person had a problem, another could usually fix it</a:t>
-            </a:r>
-          </a:p>
-          <a:p>
-            <a:r>
-              <a:rPr lang="en-US" dirty="0"/>
-              <a:t>What we would include in version 2.0:</a:t>
-            </a:r>
-          </a:p>
-          <a:p>
-            <a:pPr lvl="1"/>
-            <a:r>
-              <a:rPr lang="en-US" sz="2000" dirty="0"/>
-              <a:t>Bertrand Library level</a:t>
-            </a:r>
-          </a:p>
-          <a:p>
-            <a:pPr lvl="1"/>
-            <a:r>
-              <a:rPr lang="en-US" sz="2000" dirty="0"/>
-              <a:t>Ghost “Personalities”</a:t>
+              <a:rPr lang="en-US" sz="4000" dirty="0"/>
+              <a:t>Challenges</a:t>
+            </a:r>
+          </a:p>
+          <a:p>
+            <a:r>
+              <a:rPr lang="en-US" sz="4000" dirty="0"/>
+              <a:t>What we wish we had finished</a:t>
             </a:r>
           </a:p>
         </p:txBody>
@@ -8802,6 +8186,24 @@
 </file>
 
 <file path=customXml/item1.xml><?xml version="1.0" encoding="utf-8"?>
+<p:properties xmlns:p="http://schemas.microsoft.com/office/2006/metadata/properties" xmlns:xsi="http://www.w3.org/2001/XMLSchema-instance" xmlns:pc="http://schemas.microsoft.com/office/infopath/2007/PartnerControls">
+  <documentManagement>
+    <Status xmlns="71af3243-3dd4-4a8d-8c0d-dd76da1f02a5">Not started</Status>
+    <MediaServiceKeyPoints xmlns="71af3243-3dd4-4a8d-8c0d-dd76da1f02a5" xsi:nil="true"/>
+  </documentManagement>
+</p:properties>
+</file>
+
+<file path=customXml/item2.xml><?xml version="1.0" encoding="utf-8"?>
+<?mso-contentType ?>
+<FormTemplates xmlns="http://schemas.microsoft.com/sharepoint/v3/contenttype/forms">
+  <Display>DocumentLibraryForm</Display>
+  <Edit>DocumentLibraryForm</Edit>
+  <New>DocumentLibraryForm</New>
+</FormTemplates>
+</file>
+
+<file path=customXml/item3.xml><?xml version="1.0" encoding="utf-8"?>
 <ct:contentTypeSchema xmlns:ct="http://schemas.microsoft.com/office/2006/metadata/contentType" xmlns:ma="http://schemas.microsoft.com/office/2006/metadata/properties/metaAttributes" ct:_="" ma:_="" ma:contentTypeName="Document" ma:contentTypeID="0x01010079F111ED35F8CC479449609E8A0923A6" ma:contentTypeVersion="12" ma:contentTypeDescription="Create a new document." ma:contentTypeScope="" ma:versionID="93813dd7ca6ad654711aa0ab317e03a3">
   <xsd:schema xmlns:xsd="http://www.w3.org/2001/XMLSchema" xmlns:xs="http://www.w3.org/2001/XMLSchema" xmlns:p="http://schemas.microsoft.com/office/2006/metadata/properties" xmlns:ns2="71af3243-3dd4-4a8d-8c0d-dd76da1f02a5" xmlns:ns3="16c05727-aa75-4e4a-9b5f-8a80a1165891" targetNamespace="http://schemas.microsoft.com/office/2006/metadata/properties" ma:root="true" ma:fieldsID="f11dc0ce689dd3925e84e4e35398c6e7" ns2:_="" ns3:_="">
     <xsd:import namespace="71af3243-3dd4-4a8d-8c0d-dd76da1f02a5"/>
@@ -9022,25 +8424,25 @@
 </ct:contentTypeSchema>
 </file>
 
-<file path=customXml/item2.xml><?xml version="1.0" encoding="utf-8"?>
-<?mso-contentType ?>
-<FormTemplates xmlns="http://schemas.microsoft.com/sharepoint/v3/contenttype/forms">
-  <Display>DocumentLibraryForm</Display>
-  <Edit>DocumentLibraryForm</Edit>
-  <New>DocumentLibraryForm</New>
-</FormTemplates>
+<file path=customXml/itemProps1.xml><?xml version="1.0" encoding="utf-8"?>
+<ds:datastoreItem xmlns:ds="http://schemas.openxmlformats.org/officeDocument/2006/customXml" ds:itemID="{048C88F1-1664-415F-AFCE-F6CF45809817}">
+  <ds:schemaRefs>
+    <ds:schemaRef ds:uri="http://schemas.microsoft.com/office/2006/metadata/properties"/>
+    <ds:schemaRef ds:uri="http://schemas.microsoft.com/office/infopath/2007/PartnerControls"/>
+    <ds:schemaRef ds:uri="71af3243-3dd4-4a8d-8c0d-dd76da1f02a5"/>
+  </ds:schemaRefs>
+</ds:datastoreItem>
 </file>
 
-<file path=customXml/item3.xml><?xml version="1.0" encoding="utf-8"?>
-<p:properties xmlns:p="http://schemas.microsoft.com/office/2006/metadata/properties" xmlns:xsi="http://www.w3.org/2001/XMLSchema-instance" xmlns:pc="http://schemas.microsoft.com/office/infopath/2007/PartnerControls">
-  <documentManagement>
-    <Status xmlns="71af3243-3dd4-4a8d-8c0d-dd76da1f02a5">Not started</Status>
-    <MediaServiceKeyPoints xmlns="71af3243-3dd4-4a8d-8c0d-dd76da1f02a5" xsi:nil="true"/>
-  </documentManagement>
-</p:properties>
+<file path=customXml/itemProps2.xml><?xml version="1.0" encoding="utf-8"?>
+<ds:datastoreItem xmlns:ds="http://schemas.openxmlformats.org/officeDocument/2006/customXml" ds:itemID="{0D16958A-754B-4396-9457-FD7A427A37DD}">
+  <ds:schemaRefs>
+    <ds:schemaRef ds:uri="http://schemas.microsoft.com/sharepoint/v3/contenttype/forms"/>
+  </ds:schemaRefs>
+</ds:datastoreItem>
 </file>
 
-<file path=customXml/itemProps1.xml><?xml version="1.0" encoding="utf-8"?>
+<file path=customXml/itemProps3.xml><?xml version="1.0" encoding="utf-8"?>
 <ds:datastoreItem xmlns:ds="http://schemas.openxmlformats.org/officeDocument/2006/customXml" ds:itemID="{CC30393A-FEC6-4A44-9E4A-6EA49F1F7DC0}">
   <ds:schemaRefs>
     <ds:schemaRef ds:uri="http://schemas.microsoft.com/office/2006/metadata/contentType"/>
@@ -9057,22 +8459,4 @@
     <ds:schemaRef ds:uri="http://schemas.microsoft.com/internal/obd"/>
   </ds:schemaRefs>
 </ds:datastoreItem>
-</file>
-
-<file path=customXml/itemProps2.xml><?xml version="1.0" encoding="utf-8"?>
-<ds:datastoreItem xmlns:ds="http://schemas.openxmlformats.org/officeDocument/2006/customXml" ds:itemID="{0D16958A-754B-4396-9457-FD7A427A37DD}">
-  <ds:schemaRefs>
-    <ds:schemaRef ds:uri="http://schemas.microsoft.com/sharepoint/v3/contenttype/forms"/>
-  </ds:schemaRefs>
-</ds:datastoreItem>
-</file>
-
-<file path=customXml/itemProps3.xml><?xml version="1.0" encoding="utf-8"?>
-<ds:datastoreItem xmlns:ds="http://schemas.openxmlformats.org/officeDocument/2006/customXml" ds:itemID="{048C88F1-1664-415F-AFCE-F6CF45809817}">
-  <ds:schemaRefs>
-    <ds:schemaRef ds:uri="http://schemas.microsoft.com/office/2006/metadata/properties"/>
-    <ds:schemaRef ds:uri="http://schemas.microsoft.com/office/infopath/2007/PartnerControls"/>
-    <ds:schemaRef ds:uri="71af3243-3dd4-4a8d-8c0d-dd76da1f02a5"/>
-  </ds:schemaRefs>
-</ds:datastoreItem>
 </file>
</xml_diff>